<commit_message>
Checkpoint. Before range normalizing.
Revert to here if anything goes wrong with range normalization.
</commit_message>
<xml_diff>
--- a/analysis/submitted_analyses/fixation_process.pptx
+++ b/analysis/submitted_analyses/fixation_process.pptx
@@ -197,7 +197,7 @@
           <a:p>
             <a:fld id="{9C6F0873-8CB7-504D-9864-58FDE15F938D}" type="datetimeFigureOut">
               <a:rPr lang="en-US" smtClean="0"/>
-              <a:t>6/16/24</a:t>
+              <a:t>6/18/24</a:t>
             </a:fld>
             <a:endParaRPr lang="en-US"/>
           </a:p>
@@ -679,7 +679,7 @@
           <a:p>
             <a:fld id="{CFC60B5F-2253-DF41-8690-61B53F1555CE}" type="datetimeFigureOut">
               <a:rPr lang="en-US" smtClean="0"/>
-              <a:t>6/16/24</a:t>
+              <a:t>6/18/24</a:t>
             </a:fld>
             <a:endParaRPr lang="en-US"/>
           </a:p>
@@ -849,7 +849,7 @@
           <a:p>
             <a:fld id="{CFC60B5F-2253-DF41-8690-61B53F1555CE}" type="datetimeFigureOut">
               <a:rPr lang="en-US" smtClean="0"/>
-              <a:t>6/16/24</a:t>
+              <a:t>6/18/24</a:t>
             </a:fld>
             <a:endParaRPr lang="en-US"/>
           </a:p>
@@ -1029,7 +1029,7 @@
           <a:p>
             <a:fld id="{CFC60B5F-2253-DF41-8690-61B53F1555CE}" type="datetimeFigureOut">
               <a:rPr lang="en-US" smtClean="0"/>
-              <a:t>6/16/24</a:t>
+              <a:t>6/18/24</a:t>
             </a:fld>
             <a:endParaRPr lang="en-US"/>
           </a:p>
@@ -1199,7 +1199,7 @@
           <a:p>
             <a:fld id="{CFC60B5F-2253-DF41-8690-61B53F1555CE}" type="datetimeFigureOut">
               <a:rPr lang="en-US" smtClean="0"/>
-              <a:t>6/16/24</a:t>
+              <a:t>6/18/24</a:t>
             </a:fld>
             <a:endParaRPr lang="en-US"/>
           </a:p>
@@ -1443,7 +1443,7 @@
           <a:p>
             <a:fld id="{CFC60B5F-2253-DF41-8690-61B53F1555CE}" type="datetimeFigureOut">
               <a:rPr lang="en-US" smtClean="0"/>
-              <a:t>6/16/24</a:t>
+              <a:t>6/18/24</a:t>
             </a:fld>
             <a:endParaRPr lang="en-US"/>
           </a:p>
@@ -1675,7 +1675,7 @@
           <a:p>
             <a:fld id="{CFC60B5F-2253-DF41-8690-61B53F1555CE}" type="datetimeFigureOut">
               <a:rPr lang="en-US" smtClean="0"/>
-              <a:t>6/16/24</a:t>
+              <a:t>6/18/24</a:t>
             </a:fld>
             <a:endParaRPr lang="en-US"/>
           </a:p>
@@ -2042,7 +2042,7 @@
           <a:p>
             <a:fld id="{CFC60B5F-2253-DF41-8690-61B53F1555CE}" type="datetimeFigureOut">
               <a:rPr lang="en-US" smtClean="0"/>
-              <a:t>6/16/24</a:t>
+              <a:t>6/18/24</a:t>
             </a:fld>
             <a:endParaRPr lang="en-US"/>
           </a:p>
@@ -2160,7 +2160,7 @@
           <a:p>
             <a:fld id="{CFC60B5F-2253-DF41-8690-61B53F1555CE}" type="datetimeFigureOut">
               <a:rPr lang="en-US" smtClean="0"/>
-              <a:t>6/16/24</a:t>
+              <a:t>6/18/24</a:t>
             </a:fld>
             <a:endParaRPr lang="en-US"/>
           </a:p>
@@ -2255,7 +2255,7 @@
           <a:p>
             <a:fld id="{CFC60B5F-2253-DF41-8690-61B53F1555CE}" type="datetimeFigureOut">
               <a:rPr lang="en-US" smtClean="0"/>
-              <a:t>6/16/24</a:t>
+              <a:t>6/18/24</a:t>
             </a:fld>
             <a:endParaRPr lang="en-US"/>
           </a:p>
@@ -2532,7 +2532,7 @@
           <a:p>
             <a:fld id="{CFC60B5F-2253-DF41-8690-61B53F1555CE}" type="datetimeFigureOut">
               <a:rPr lang="en-US" smtClean="0"/>
-              <a:t>6/16/24</a:t>
+              <a:t>6/18/24</a:t>
             </a:fld>
             <a:endParaRPr lang="en-US"/>
           </a:p>
@@ -2789,7 +2789,7 @@
           <a:p>
             <a:fld id="{CFC60B5F-2253-DF41-8690-61B53F1555CE}" type="datetimeFigureOut">
               <a:rPr lang="en-US" smtClean="0"/>
-              <a:t>6/16/24</a:t>
+              <a:t>6/18/24</a:t>
             </a:fld>
             <a:endParaRPr lang="en-US"/>
           </a:p>
@@ -3002,7 +3002,7 @@
           <a:p>
             <a:fld id="{CFC60B5F-2253-DF41-8690-61B53F1555CE}" type="datetimeFigureOut">
               <a:rPr lang="en-US" smtClean="0"/>
-              <a:t>6/16/24</a:t>
+              <a:t>6/18/24</a:t>
             </a:fld>
             <a:endParaRPr lang="en-US"/>
           </a:p>

</xml_diff>